<commit_message>
Updated code samples and demos
</commit_message>
<xml_diff>
--- a/Elixir.pptx
+++ b/Elixir.pptx
@@ -952,7 +952,7 @@
           </a:ln>
           <a:extLst>
             <a:ext uri="{C572A759-6A51-4108-AA02-DFA0A04FC94B}">
-              <ma14:wrappingTextBoxFlag xmlns:m="http://schemas.openxmlformats.org/officeDocument/2006/math" xmlns:a14="http://schemas.microsoft.com/office/drawing/2010/main" xmlns:ma14="http://schemas.microsoft.com/office/mac/drawingml/2011/main" xmlns="" val="1"/>
+              <ma14:wrappingTextBoxFlag xmlns="" xmlns:ma14="http://schemas.microsoft.com/office/mac/drawingml/2011/main" xmlns:a14="http://schemas.microsoft.com/office/drawing/2010/main" xmlns:m="http://schemas.openxmlformats.org/officeDocument/2006/math" val="1"/>
             </a:ext>
           </a:extLst>
         </p:spPr>
@@ -1227,7 +1227,7 @@
           </a:ln>
           <a:extLst>
             <a:ext uri="{C572A759-6A51-4108-AA02-DFA0A04FC94B}">
-              <ma14:wrappingTextBoxFlag xmlns:m="http://schemas.openxmlformats.org/officeDocument/2006/math" xmlns:a14="http://schemas.microsoft.com/office/drawing/2010/main" xmlns:ma14="http://schemas.microsoft.com/office/mac/drawingml/2011/main" xmlns="" val="1"/>
+              <ma14:wrappingTextBoxFlag xmlns="" xmlns:ma14="http://schemas.microsoft.com/office/mac/drawingml/2011/main" xmlns:a14="http://schemas.microsoft.com/office/drawing/2010/main" xmlns:m="http://schemas.openxmlformats.org/officeDocument/2006/math" val="1"/>
             </a:ext>
           </a:extLst>
         </p:spPr>
@@ -1666,7 +1666,7 @@
           </a:ln>
           <a:extLst>
             <a:ext uri="{C572A759-6A51-4108-AA02-DFA0A04FC94B}">
-              <ma14:wrappingTextBoxFlag xmlns:m="http://schemas.openxmlformats.org/officeDocument/2006/math" xmlns:a14="http://schemas.microsoft.com/office/drawing/2010/main" xmlns:ma14="http://schemas.microsoft.com/office/mac/drawingml/2011/main" xmlns="" val="1"/>
+              <ma14:wrappingTextBoxFlag xmlns="" xmlns:ma14="http://schemas.microsoft.com/office/mac/drawingml/2011/main" xmlns:a14="http://schemas.microsoft.com/office/drawing/2010/main" xmlns:m="http://schemas.openxmlformats.org/officeDocument/2006/math" val="1"/>
             </a:ext>
           </a:extLst>
         </p:spPr>
@@ -1886,7 +1886,7 @@
           </a:ln>
           <a:extLst>
             <a:ext uri="{C572A759-6A51-4108-AA02-DFA0A04FC94B}">
-              <ma14:wrappingTextBoxFlag xmlns:m="http://schemas.openxmlformats.org/officeDocument/2006/math" xmlns:a14="http://schemas.microsoft.com/office/drawing/2010/main" xmlns:ma14="http://schemas.microsoft.com/office/mac/drawingml/2011/main" xmlns="" val="1"/>
+              <ma14:wrappingTextBoxFlag xmlns="" xmlns:ma14="http://schemas.microsoft.com/office/mac/drawingml/2011/main" xmlns:a14="http://schemas.microsoft.com/office/drawing/2010/main" xmlns:m="http://schemas.openxmlformats.org/officeDocument/2006/math" val="1"/>
             </a:ext>
           </a:extLst>
         </p:spPr>
@@ -2087,7 +2087,7 @@
           </a:ln>
           <a:extLst>
             <a:ext uri="{C572A759-6A51-4108-AA02-DFA0A04FC94B}">
-              <ma14:wrappingTextBoxFlag xmlns:m="http://schemas.openxmlformats.org/officeDocument/2006/math" xmlns:a14="http://schemas.microsoft.com/office/drawing/2010/main" xmlns:ma14="http://schemas.microsoft.com/office/mac/drawingml/2011/main" xmlns="" val="1"/>
+              <ma14:wrappingTextBoxFlag xmlns="" xmlns:ma14="http://schemas.microsoft.com/office/mac/drawingml/2011/main" xmlns:a14="http://schemas.microsoft.com/office/drawing/2010/main" xmlns:m="http://schemas.openxmlformats.org/officeDocument/2006/math" val="1"/>
             </a:ext>
           </a:extLst>
         </p:spPr>
@@ -2186,7 +2186,7 @@
           </a:ln>
           <a:extLst>
             <a:ext uri="{C572A759-6A51-4108-AA02-DFA0A04FC94B}">
-              <ma14:wrappingTextBoxFlag xmlns:m="http://schemas.openxmlformats.org/officeDocument/2006/math" xmlns:a14="http://schemas.microsoft.com/office/drawing/2010/main" xmlns:ma14="http://schemas.microsoft.com/office/mac/drawingml/2011/main" xmlns="" val="1"/>
+              <ma14:wrappingTextBoxFlag xmlns="" xmlns:ma14="http://schemas.microsoft.com/office/mac/drawingml/2011/main" xmlns:a14="http://schemas.microsoft.com/office/drawing/2010/main" xmlns:m="http://schemas.openxmlformats.org/officeDocument/2006/math" val="1"/>
             </a:ext>
           </a:extLst>
         </p:spPr>
@@ -2225,7 +2225,7 @@
           </a:ln>
           <a:extLst>
             <a:ext uri="{C572A759-6A51-4108-AA02-DFA0A04FC94B}">
-              <ma14:wrappingTextBoxFlag xmlns:m="http://schemas.openxmlformats.org/officeDocument/2006/math" xmlns:a14="http://schemas.microsoft.com/office/drawing/2010/main" xmlns:ma14="http://schemas.microsoft.com/office/mac/drawingml/2011/main" xmlns="" val="1"/>
+              <ma14:wrappingTextBoxFlag xmlns="" xmlns:ma14="http://schemas.microsoft.com/office/mac/drawingml/2011/main" xmlns:a14="http://schemas.microsoft.com/office/drawing/2010/main" xmlns:m="http://schemas.openxmlformats.org/officeDocument/2006/math" val="1"/>
             </a:ext>
           </a:extLst>
         </p:spPr>
@@ -2385,7 +2385,7 @@
           </a:ln>
           <a:extLst>
             <a:ext uri="{C572A759-6A51-4108-AA02-DFA0A04FC94B}">
-              <ma14:wrappingTextBoxFlag xmlns:m="http://schemas.openxmlformats.org/officeDocument/2006/math" xmlns:a14="http://schemas.microsoft.com/office/drawing/2010/main" xmlns:ma14="http://schemas.microsoft.com/office/mac/drawingml/2011/main" xmlns="" val="1"/>
+              <ma14:wrappingTextBoxFlag xmlns="" xmlns:ma14="http://schemas.microsoft.com/office/mac/drawingml/2011/main" xmlns:a14="http://schemas.microsoft.com/office/drawing/2010/main" xmlns:m="http://schemas.openxmlformats.org/officeDocument/2006/math" val="1"/>
             </a:ext>
           </a:extLst>
         </p:spPr>
@@ -3633,10 +3633,10 @@
       </p:sp>
       <p:pic>
         <p:nvPicPr>
-          <p:cNvPr id="7" name="Picture 6">
+          <p:cNvPr id="5" name="Picture 4">
             <a:extLst>
               <a:ext uri="{FF2B5EF4-FFF2-40B4-BE49-F238E27FC236}">
-                <a16:creationId xmlns:a16="http://schemas.microsoft.com/office/drawing/2014/main" id="{C3D9CB00-B604-4964-80B8-6EE3E302B9A0}"/>
+                <a16:creationId xmlns:a16="http://schemas.microsoft.com/office/drawing/2014/main" id="{9CBB0262-DB58-6FAC-B63C-3D6CF75EF600}"/>
               </a:ext>
             </a:extLst>
           </p:cNvPr>
@@ -3653,8 +3653,8 @@
         </p:blipFill>
         <p:spPr>
           <a:xfrm>
-            <a:off x="6705600" y="1958391"/>
-            <a:ext cx="4648200" cy="1685925"/>
+            <a:off x="6481716" y="2192681"/>
+            <a:ext cx="4872084" cy="1592184"/>
           </a:xfrm>
           <a:prstGeom prst="rect">
             <a:avLst/>
@@ -3780,10 +3780,10 @@
       </p:pic>
       <p:pic>
         <p:nvPicPr>
-          <p:cNvPr id="11" name="Picture 10">
+          <p:cNvPr id="5" name="Picture 4">
             <a:extLst>
               <a:ext uri="{FF2B5EF4-FFF2-40B4-BE49-F238E27FC236}">
-                <a16:creationId xmlns:a16="http://schemas.microsoft.com/office/drawing/2014/main" id="{50E563B6-880C-4DDB-95CF-D7806FD1045F}"/>
+                <a16:creationId xmlns:a16="http://schemas.microsoft.com/office/drawing/2014/main" id="{D006F4A3-8E03-670A-2D39-98BA820C6CE6}"/>
               </a:ext>
             </a:extLst>
           </p:cNvPr>
@@ -3800,8 +3800,8 @@
         </p:blipFill>
         <p:spPr>
           <a:xfrm>
-            <a:off x="838200" y="1916699"/>
-            <a:ext cx="4648200" cy="3209925"/>
+            <a:off x="838200" y="2008868"/>
+            <a:ext cx="5143500" cy="3025588"/>
           </a:xfrm>
           <a:prstGeom prst="rect">
             <a:avLst/>
@@ -4463,6 +4463,19 @@
               <a:t>message passing</a:t>
             </a:r>
           </a:p>
+          <a:p>
+            <a:pPr lvl="1"/>
+            <a:endParaRPr lang="en-US" dirty="0"/>
+          </a:p>
+          <a:p>
+            <a:pPr marL="457200" lvl="1" indent="0">
+              <a:buNone/>
+            </a:pPr>
+            <a:r>
+              <a:rPr lang="en-US" dirty="0"/>
+              <a:t>… sounds familiar?</a:t>
+            </a:r>
+          </a:p>
         </p:txBody>
       </p:sp>
       <p:pic>
@@ -4506,6 +4519,85 @@
     <a:masterClrMapping/>
   </p:clrMapOvr>
   <p:transition spd="med"/>
+  <p:timing>
+    <p:tnLst>
+      <p:par>
+        <p:cTn id="1" dur="indefinite" restart="never" nodeType="tmRoot">
+          <p:childTnLst>
+            <p:seq concurrent="1" nextAc="seek">
+              <p:cTn id="2" dur="indefinite" nodeType="mainSeq">
+                <p:childTnLst>
+                  <p:par>
+                    <p:cTn id="3" fill="hold">
+                      <p:stCondLst>
+                        <p:cond delay="indefinite"/>
+                      </p:stCondLst>
+                      <p:childTnLst>
+                        <p:par>
+                          <p:cTn id="4" fill="hold">
+                            <p:stCondLst>
+                              <p:cond delay="0"/>
+                            </p:stCondLst>
+                            <p:childTnLst>
+                              <p:par>
+                                <p:cTn id="5" presetID="1" presetClass="entr" presetSubtype="0" fill="hold" nodeType="clickEffect">
+                                  <p:stCondLst>
+                                    <p:cond delay="0"/>
+                                  </p:stCondLst>
+                                  <p:childTnLst>
+                                    <p:set>
+                                      <p:cBhvr>
+                                        <p:cTn id="6" dur="1" fill="hold">
+                                          <p:stCondLst>
+                                            <p:cond delay="0"/>
+                                          </p:stCondLst>
+                                        </p:cTn>
+                                        <p:tgtEl>
+                                          <p:spTgt spid="3">
+                                            <p:txEl>
+                                              <p:pRg st="7" end="7"/>
+                                            </p:txEl>
+                                          </p:spTgt>
+                                        </p:tgtEl>
+                                        <p:attrNameLst>
+                                          <p:attrName>style.visibility</p:attrName>
+                                        </p:attrNameLst>
+                                      </p:cBhvr>
+                                      <p:to>
+                                        <p:strVal val="visible"/>
+                                      </p:to>
+                                    </p:set>
+                                  </p:childTnLst>
+                                </p:cTn>
+                              </p:par>
+                            </p:childTnLst>
+                          </p:cTn>
+                        </p:par>
+                      </p:childTnLst>
+                    </p:cTn>
+                  </p:par>
+                </p:childTnLst>
+              </p:cTn>
+              <p:prevCondLst>
+                <p:cond evt="onPrev" delay="0">
+                  <p:tgtEl>
+                    <p:sldTgt/>
+                  </p:tgtEl>
+                </p:cond>
+              </p:prevCondLst>
+              <p:nextCondLst>
+                <p:cond evt="onNext" delay="0">
+                  <p:tgtEl>
+                    <p:sldTgt/>
+                  </p:tgtEl>
+                </p:cond>
+              </p:nextCondLst>
+            </p:seq>
+          </p:childTnLst>
+        </p:cTn>
+      </p:par>
+    </p:tnLst>
+  </p:timing>
 </p:sld>
 </file>
 
@@ -8391,15 +8483,6 @@
 </file>
 
 <file path=customXml/item1.xml><?xml version="1.0" encoding="utf-8"?>
-<?mso-contentType ?>
-<FormTemplates xmlns="http://schemas.microsoft.com/sharepoint/v3/contenttype/forms">
-  <Display>DocumentLibraryForm</Display>
-  <Edit>DocumentLibraryForm</Edit>
-  <New>DocumentLibraryForm</New>
-</FormTemplates>
-</file>
-
-<file path=customXml/item2.xml><?xml version="1.0" encoding="utf-8"?>
 <p:properties xmlns:p="http://schemas.microsoft.com/office/2006/metadata/properties" xmlns:xsi="http://www.w3.org/2001/XMLSchema-instance" xmlns:pc="http://schemas.microsoft.com/office/infopath/2007/PartnerControls">
   <documentManagement>
     <_dlc_DocId xmlns="ee5a019c-1afb-4a7f-aa3c-a300d54b8a94">4ZA6FPYH4N22-134279970-49061</_dlc_DocId>
@@ -8415,57 +8498,16 @@
 </p:properties>
 </file>
 
-<file path=customXml/item3.xml><?xml version="1.0" encoding="utf-8"?>
+<file path=customXml/item2.xml><?xml version="1.0" encoding="utf-8"?>
 <?mso-contentType ?>
-<spe:Receivers xmlns:spe="http://schemas.microsoft.com/sharepoint/events">
-  <Receiver>
-    <Name>Document ID Generator</Name>
-    <Synchronization>Synchronous</Synchronization>
-    <Type>10001</Type>
-    <SequenceNumber>1000</SequenceNumber>
-    <Url/>
-    <Assembly>Microsoft.Office.DocumentManagement, Version=16.0.0.0, Culture=neutral, PublicKeyToken=71e9bce111e9429c</Assembly>
-    <Class>Microsoft.Office.DocumentManagement.Internal.DocIdHandler</Class>
-    <Data/>
-    <Filter/>
-  </Receiver>
-  <Receiver>
-    <Name>Document ID Generator</Name>
-    <Synchronization>Synchronous</Synchronization>
-    <Type>10002</Type>
-    <SequenceNumber>1001</SequenceNumber>
-    <Url/>
-    <Assembly>Microsoft.Office.DocumentManagement, Version=16.0.0.0, Culture=neutral, PublicKeyToken=71e9bce111e9429c</Assembly>
-    <Class>Microsoft.Office.DocumentManagement.Internal.DocIdHandler</Class>
-    <Data/>
-    <Filter/>
-  </Receiver>
-  <Receiver>
-    <Name>Document ID Generator</Name>
-    <Synchronization>Synchronous</Synchronization>
-    <Type>10004</Type>
-    <SequenceNumber>1002</SequenceNumber>
-    <Url/>
-    <Assembly>Microsoft.Office.DocumentManagement, Version=16.0.0.0, Culture=neutral, PublicKeyToken=71e9bce111e9429c</Assembly>
-    <Class>Microsoft.Office.DocumentManagement.Internal.DocIdHandler</Class>
-    <Data/>
-    <Filter/>
-  </Receiver>
-  <Receiver>
-    <Name>Document ID Generator</Name>
-    <Synchronization>Synchronous</Synchronization>
-    <Type>10006</Type>
-    <SequenceNumber>1003</SequenceNumber>
-    <Url/>
-    <Assembly>Microsoft.Office.DocumentManagement, Version=16.0.0.0, Culture=neutral, PublicKeyToken=71e9bce111e9429c</Assembly>
-    <Class>Microsoft.Office.DocumentManagement.Internal.DocIdHandler</Class>
-    <Data/>
-    <Filter/>
-  </Receiver>
-</spe:Receivers>
+<FormTemplates xmlns="http://schemas.microsoft.com/sharepoint/v3/contenttype/forms">
+  <Display>DocumentLibraryForm</Display>
+  <Edit>DocumentLibraryForm</Edit>
+  <New>DocumentLibraryForm</New>
+</FormTemplates>
 </file>
 
-<file path=customXml/item4.xml><?xml version="1.0" encoding="utf-8"?>
+<file path=customXml/item3.xml><?xml version="1.0" encoding="utf-8"?>
 <ct:contentTypeSchema xmlns:ct="http://schemas.microsoft.com/office/2006/metadata/contentType" xmlns:ma="http://schemas.microsoft.com/office/2006/metadata/properties/metaAttributes" ct:_="" ma:_="" ma:contentTypeName="Document" ma:contentTypeID="0x0101003F118A156F01C84E8E5E451D60C9243C" ma:contentTypeVersion="18" ma:contentTypeDescription="Create a new document." ma:contentTypeScope="" ma:versionID="81bba4710e6ed34fea4bd7f33693d27f">
   <xsd:schema xmlns:xsd="http://www.w3.org/2001/XMLSchema" xmlns:xs="http://www.w3.org/2001/XMLSchema" xmlns:p="http://schemas.microsoft.com/office/2006/metadata/properties" xmlns:ns2="ee5a019c-1afb-4a7f-aa3c-a300d54b8a94" xmlns:ns3="3d51c85a-c808-4fa3-a7c4-399d30d41b71" xmlns:ns4="cabbaafa-9d61-4c96-bf36-3d40c487f168" targetNamespace="http://schemas.microsoft.com/office/2006/metadata/properties" ma:root="true" ma:fieldsID="ea50bd8bc227bb2cc5fe2d0a23ee5167" ns2:_="" ns3:_="" ns4:_="">
     <xsd:import namespace="ee5a019c-1afb-4a7f-aa3c-a300d54b8a94"/>
@@ -8738,15 +8780,57 @@
 </ct:contentTypeSchema>
 </file>
 
-<file path=customXml/itemProps1.xml><?xml version="1.0" encoding="utf-8"?>
-<ds:datastoreItem xmlns:ds="http://schemas.openxmlformats.org/officeDocument/2006/customXml" ds:itemID="{450D9D61-AB1C-42DB-97B3-F16948BBEDA5}">
-  <ds:schemaRefs>
-    <ds:schemaRef ds:uri="http://schemas.microsoft.com/sharepoint/v3/contenttype/forms"/>
-  </ds:schemaRefs>
-</ds:datastoreItem>
+<file path=customXml/item4.xml><?xml version="1.0" encoding="utf-8"?>
+<?mso-contentType ?>
+<spe:Receivers xmlns:spe="http://schemas.microsoft.com/sharepoint/events">
+  <Receiver>
+    <Name>Document ID Generator</Name>
+    <Synchronization>Synchronous</Synchronization>
+    <Type>10001</Type>
+    <SequenceNumber>1000</SequenceNumber>
+    <Url/>
+    <Assembly>Microsoft.Office.DocumentManagement, Version=16.0.0.0, Culture=neutral, PublicKeyToken=71e9bce111e9429c</Assembly>
+    <Class>Microsoft.Office.DocumentManagement.Internal.DocIdHandler</Class>
+    <Data/>
+    <Filter/>
+  </Receiver>
+  <Receiver>
+    <Name>Document ID Generator</Name>
+    <Synchronization>Synchronous</Synchronization>
+    <Type>10002</Type>
+    <SequenceNumber>1001</SequenceNumber>
+    <Url/>
+    <Assembly>Microsoft.Office.DocumentManagement, Version=16.0.0.0, Culture=neutral, PublicKeyToken=71e9bce111e9429c</Assembly>
+    <Class>Microsoft.Office.DocumentManagement.Internal.DocIdHandler</Class>
+    <Data/>
+    <Filter/>
+  </Receiver>
+  <Receiver>
+    <Name>Document ID Generator</Name>
+    <Synchronization>Synchronous</Synchronization>
+    <Type>10004</Type>
+    <SequenceNumber>1002</SequenceNumber>
+    <Url/>
+    <Assembly>Microsoft.Office.DocumentManagement, Version=16.0.0.0, Culture=neutral, PublicKeyToken=71e9bce111e9429c</Assembly>
+    <Class>Microsoft.Office.DocumentManagement.Internal.DocIdHandler</Class>
+    <Data/>
+    <Filter/>
+  </Receiver>
+  <Receiver>
+    <Name>Document ID Generator</Name>
+    <Synchronization>Synchronous</Synchronization>
+    <Type>10006</Type>
+    <SequenceNumber>1003</SequenceNumber>
+    <Url/>
+    <Assembly>Microsoft.Office.DocumentManagement, Version=16.0.0.0, Culture=neutral, PublicKeyToken=71e9bce111e9429c</Assembly>
+    <Class>Microsoft.Office.DocumentManagement.Internal.DocIdHandler</Class>
+    <Data/>
+    <Filter/>
+  </Receiver>
+</spe:Receivers>
 </file>
 
-<file path=customXml/itemProps2.xml><?xml version="1.0" encoding="utf-8"?>
+<file path=customXml/itemProps1.xml><?xml version="1.0" encoding="utf-8"?>
 <ds:datastoreItem xmlns:ds="http://schemas.openxmlformats.org/officeDocument/2006/customXml" ds:itemID="{28013F97-F744-428B-8504-911AB7D87FBC}">
   <ds:schemaRefs>
     <ds:schemaRef ds:uri="ee5a019c-1afb-4a7f-aa3c-a300d54b8a94"/>
@@ -8757,15 +8841,15 @@
 </ds:datastoreItem>
 </file>
 
-<file path=customXml/itemProps3.xml><?xml version="1.0" encoding="utf-8"?>
-<ds:datastoreItem xmlns:ds="http://schemas.openxmlformats.org/officeDocument/2006/customXml" ds:itemID="{23731FFE-AA89-41C8-A8D1-96335015AC7D}">
+<file path=customXml/itemProps2.xml><?xml version="1.0" encoding="utf-8"?>
+<ds:datastoreItem xmlns:ds="http://schemas.openxmlformats.org/officeDocument/2006/customXml" ds:itemID="{450D9D61-AB1C-42DB-97B3-F16948BBEDA5}">
   <ds:schemaRefs>
-    <ds:schemaRef ds:uri="http://schemas.microsoft.com/sharepoint/events"/>
+    <ds:schemaRef ds:uri="http://schemas.microsoft.com/sharepoint/v3/contenttype/forms"/>
   </ds:schemaRefs>
 </ds:datastoreItem>
 </file>
 
-<file path=customXml/itemProps4.xml><?xml version="1.0" encoding="utf-8"?>
+<file path=customXml/itemProps3.xml><?xml version="1.0" encoding="utf-8"?>
 <ds:datastoreItem xmlns:ds="http://schemas.openxmlformats.org/officeDocument/2006/customXml" ds:itemID="{D75CE82B-2AB8-470D-8DBA-A4AFD7F9BDEE}">
   <ds:schemaRefs>
     <ds:schemaRef ds:uri="http://schemas.microsoft.com/office/2006/metadata/contentType"/>
@@ -8783,4 +8867,12 @@
     <ds:schemaRef ds:uri="http://schemas.microsoft.com/internal/obd"/>
   </ds:schemaRefs>
 </ds:datastoreItem>
+</file>
+
+<file path=customXml/itemProps4.xml><?xml version="1.0" encoding="utf-8"?>
+<ds:datastoreItem xmlns:ds="http://schemas.openxmlformats.org/officeDocument/2006/customXml" ds:itemID="{23731FFE-AA89-41C8-A8D1-96335015AC7D}">
+  <ds:schemaRefs>
+    <ds:schemaRef ds:uri="http://schemas.microsoft.com/sharepoint/events"/>
+  </ds:schemaRefs>
+</ds:datastoreItem>
 </file>
</xml_diff>

<commit_message>
Added language logos to slides
</commit_message>
<xml_diff>
--- a/Elixir.pptx
+++ b/Elixir.pptx
@@ -954,7 +954,7 @@
           </a:ln>
           <a:extLst>
             <a:ext uri="{C572A759-6A51-4108-AA02-DFA0A04FC94B}">
-              <ma14:wrappingTextBoxFlag xmlns:m="http://schemas.openxmlformats.org/officeDocument/2006/math" xmlns:a14="http://schemas.microsoft.com/office/drawing/2010/main" xmlns:ma14="http://schemas.microsoft.com/office/mac/drawingml/2011/main" xmlns="" val="1"/>
+              <ma14:wrappingTextBoxFlag xmlns="" xmlns:ma14="http://schemas.microsoft.com/office/mac/drawingml/2011/main" xmlns:a14="http://schemas.microsoft.com/office/drawing/2010/main" xmlns:m="http://schemas.openxmlformats.org/officeDocument/2006/math" val="1"/>
             </a:ext>
           </a:extLst>
         </p:spPr>
@@ -1229,7 +1229,7 @@
           </a:ln>
           <a:extLst>
             <a:ext uri="{C572A759-6A51-4108-AA02-DFA0A04FC94B}">
-              <ma14:wrappingTextBoxFlag xmlns:m="http://schemas.openxmlformats.org/officeDocument/2006/math" xmlns:a14="http://schemas.microsoft.com/office/drawing/2010/main" xmlns:ma14="http://schemas.microsoft.com/office/mac/drawingml/2011/main" xmlns="" val="1"/>
+              <ma14:wrappingTextBoxFlag xmlns="" xmlns:ma14="http://schemas.microsoft.com/office/mac/drawingml/2011/main" xmlns:a14="http://schemas.microsoft.com/office/drawing/2010/main" xmlns:m="http://schemas.openxmlformats.org/officeDocument/2006/math" val="1"/>
             </a:ext>
           </a:extLst>
         </p:spPr>
@@ -1668,7 +1668,7 @@
           </a:ln>
           <a:extLst>
             <a:ext uri="{C572A759-6A51-4108-AA02-DFA0A04FC94B}">
-              <ma14:wrappingTextBoxFlag xmlns:m="http://schemas.openxmlformats.org/officeDocument/2006/math" xmlns:a14="http://schemas.microsoft.com/office/drawing/2010/main" xmlns:ma14="http://schemas.microsoft.com/office/mac/drawingml/2011/main" xmlns="" val="1"/>
+              <ma14:wrappingTextBoxFlag xmlns="" xmlns:ma14="http://schemas.microsoft.com/office/mac/drawingml/2011/main" xmlns:a14="http://schemas.microsoft.com/office/drawing/2010/main" xmlns:m="http://schemas.openxmlformats.org/officeDocument/2006/math" val="1"/>
             </a:ext>
           </a:extLst>
         </p:spPr>
@@ -1888,7 +1888,7 @@
           </a:ln>
           <a:extLst>
             <a:ext uri="{C572A759-6A51-4108-AA02-DFA0A04FC94B}">
-              <ma14:wrappingTextBoxFlag xmlns:m="http://schemas.openxmlformats.org/officeDocument/2006/math" xmlns:a14="http://schemas.microsoft.com/office/drawing/2010/main" xmlns:ma14="http://schemas.microsoft.com/office/mac/drawingml/2011/main" xmlns="" val="1"/>
+              <ma14:wrappingTextBoxFlag xmlns="" xmlns:ma14="http://schemas.microsoft.com/office/mac/drawingml/2011/main" xmlns:a14="http://schemas.microsoft.com/office/drawing/2010/main" xmlns:m="http://schemas.openxmlformats.org/officeDocument/2006/math" val="1"/>
             </a:ext>
           </a:extLst>
         </p:spPr>
@@ -2089,7 +2089,7 @@
           </a:ln>
           <a:extLst>
             <a:ext uri="{C572A759-6A51-4108-AA02-DFA0A04FC94B}">
-              <ma14:wrappingTextBoxFlag xmlns:m="http://schemas.openxmlformats.org/officeDocument/2006/math" xmlns:a14="http://schemas.microsoft.com/office/drawing/2010/main" xmlns:ma14="http://schemas.microsoft.com/office/mac/drawingml/2011/main" xmlns="" val="1"/>
+              <ma14:wrappingTextBoxFlag xmlns="" xmlns:ma14="http://schemas.microsoft.com/office/mac/drawingml/2011/main" xmlns:a14="http://schemas.microsoft.com/office/drawing/2010/main" xmlns:m="http://schemas.openxmlformats.org/officeDocument/2006/math" val="1"/>
             </a:ext>
           </a:extLst>
         </p:spPr>
@@ -2188,7 +2188,7 @@
           </a:ln>
           <a:extLst>
             <a:ext uri="{C572A759-6A51-4108-AA02-DFA0A04FC94B}">
-              <ma14:wrappingTextBoxFlag xmlns:m="http://schemas.openxmlformats.org/officeDocument/2006/math" xmlns:a14="http://schemas.microsoft.com/office/drawing/2010/main" xmlns:ma14="http://schemas.microsoft.com/office/mac/drawingml/2011/main" xmlns="" val="1"/>
+              <ma14:wrappingTextBoxFlag xmlns="" xmlns:ma14="http://schemas.microsoft.com/office/mac/drawingml/2011/main" xmlns:a14="http://schemas.microsoft.com/office/drawing/2010/main" xmlns:m="http://schemas.openxmlformats.org/officeDocument/2006/math" val="1"/>
             </a:ext>
           </a:extLst>
         </p:spPr>
@@ -2227,7 +2227,7 @@
           </a:ln>
           <a:extLst>
             <a:ext uri="{C572A759-6A51-4108-AA02-DFA0A04FC94B}">
-              <ma14:wrappingTextBoxFlag xmlns:m="http://schemas.openxmlformats.org/officeDocument/2006/math" xmlns:a14="http://schemas.microsoft.com/office/drawing/2010/main" xmlns:ma14="http://schemas.microsoft.com/office/mac/drawingml/2011/main" xmlns="" val="1"/>
+              <ma14:wrappingTextBoxFlag xmlns="" xmlns:ma14="http://schemas.microsoft.com/office/mac/drawingml/2011/main" xmlns:a14="http://schemas.microsoft.com/office/drawing/2010/main" xmlns:m="http://schemas.openxmlformats.org/officeDocument/2006/math" val="1"/>
             </a:ext>
           </a:extLst>
         </p:spPr>
@@ -2387,7 +2387,7 @@
           </a:ln>
           <a:extLst>
             <a:ext uri="{C572A759-6A51-4108-AA02-DFA0A04FC94B}">
-              <ma14:wrappingTextBoxFlag xmlns:m="http://schemas.openxmlformats.org/officeDocument/2006/math" xmlns:a14="http://schemas.microsoft.com/office/drawing/2010/main" xmlns:ma14="http://schemas.microsoft.com/office/mac/drawingml/2011/main" xmlns="" val="1"/>
+              <ma14:wrappingTextBoxFlag xmlns="" xmlns:ma14="http://schemas.microsoft.com/office/mac/drawingml/2011/main" xmlns:a14="http://schemas.microsoft.com/office/drawing/2010/main" xmlns:m="http://schemas.openxmlformats.org/officeDocument/2006/math" val="1"/>
             </a:ext>
           </a:extLst>
         </p:spPr>
@@ -3507,12 +3507,59 @@
         </p:blipFill>
         <p:spPr>
           <a:xfrm>
-            <a:off x="6705600" y="2136002"/>
-            <a:ext cx="4648200" cy="1114425"/>
+            <a:off x="5692954" y="3163418"/>
+            <a:ext cx="5660846" cy="1357211"/>
           </a:xfrm>
           <a:prstGeom prst="rect">
             <a:avLst/>
           </a:prstGeom>
+        </p:spPr>
+      </p:pic>
+      <p:pic>
+        <p:nvPicPr>
+          <p:cNvPr id="2050" name="Picture 2" descr="Elixir, lang, logo Icon in Vector Logo">
+            <a:extLst>
+              <a:ext uri="{FF2B5EF4-FFF2-40B4-BE49-F238E27FC236}">
+                <a16:creationId xmlns:a16="http://schemas.microsoft.com/office/drawing/2014/main" id="{E510E199-5DD1-C825-C683-08694C4A798D}"/>
+              </a:ext>
+            </a:extLst>
+          </p:cNvPr>
+          <p:cNvPicPr>
+            <a:picLocks noChangeAspect="1" noChangeArrowheads="1"/>
+          </p:cNvPicPr>
+          <p:nvPr/>
+        </p:nvPicPr>
+        <p:blipFill>
+          <a:blip r:embed="rId3">
+            <a:extLst>
+              <a:ext uri="{28A0092B-C50C-407E-A947-70E740481C1C}">
+                <a14:useLocalDpi xmlns:a14="http://schemas.microsoft.com/office/drawing/2010/main" val="0"/>
+              </a:ext>
+            </a:extLst>
+          </a:blip>
+          <a:srcRect/>
+          <a:stretch>
+            <a:fillRect/>
+          </a:stretch>
+        </p:blipFill>
+        <p:spPr bwMode="auto">
+          <a:xfrm>
+            <a:off x="9210675" y="600557"/>
+            <a:ext cx="2143125" cy="2143125"/>
+          </a:xfrm>
+          <a:prstGeom prst="rect">
+            <a:avLst/>
+          </a:prstGeom>
+          <a:noFill/>
+          <a:extLst>
+            <a:ext uri="{909E8E84-426E-40DD-AFC4-6F175D3DCCD1}">
+              <a14:hiddenFill xmlns:a14="http://schemas.microsoft.com/office/drawing/2010/main">
+                <a:solidFill>
+                  <a:srgbClr val="FFFFFF"/>
+                </a:solidFill>
+              </a14:hiddenFill>
+            </a:ext>
+          </a:extLst>
         </p:spPr>
       </p:pic>
     </p:spTree>
@@ -3618,19 +3665,6 @@
             <a:pPr lvl="1"/>
             <a:endParaRPr lang="en-US" dirty="0"/>
           </a:p>
-          <a:p>
-            <a:r>
-              <a:rPr lang="en-US" dirty="0"/>
-              <a:t>Records in Java/C# are a </a:t>
-            </a:r>
-            <a:br>
-              <a:rPr lang="en-US" dirty="0"/>
-            </a:br>
-            <a:r>
-              <a:rPr lang="en-US" dirty="0"/>
-              <a:t>step in the right direction</a:t>
-            </a:r>
-          </a:p>
         </p:txBody>
       </p:sp>
       <p:pic>
@@ -3655,8 +3689,8 @@
         </p:blipFill>
         <p:spPr>
           <a:xfrm>
-            <a:off x="6481716" y="2192681"/>
-            <a:ext cx="4872084" cy="1592184"/>
+            <a:off x="910119" y="3133620"/>
+            <a:ext cx="6625406" cy="2165165"/>
           </a:xfrm>
           <a:prstGeom prst="rect">
             <a:avLst/>
@@ -4666,7 +4700,9 @@
         </p:nvSpPr>
         <p:spPr/>
         <p:txBody>
-          <a:bodyPr/>
+          <a:bodyPr>
+            <a:normAutofit lnSpcReduction="10000"/>
+          </a:bodyPr>
           <a:lstStyle/>
           <a:p>
             <a:r>
@@ -4690,6 +4726,13 @@
             <a:r>
               <a:rPr lang="en-US" dirty="0"/>
               <a:t>Easier to distribute</a:t>
+            </a:r>
+          </a:p>
+          <a:p>
+            <a:pPr lvl="1"/>
+            <a:r>
+              <a:rPr lang="en-US" dirty="0"/>
+              <a:t>Built-in load balancing</a:t>
             </a:r>
           </a:p>
           <a:p>
@@ -6331,6 +6374,28 @@
           <a:p>
             <a:endParaRPr lang="en-US" dirty="0"/>
           </a:p>
+          <a:p>
+            <a:r>
+              <a:rPr lang="en-US" dirty="0"/>
+              <a:t>Records in Java (since JDK 14) are a </a:t>
+            </a:r>
+            <a:br>
+              <a:rPr lang="en-US" dirty="0"/>
+            </a:br>
+            <a:r>
+              <a:rPr lang="en-US" dirty="0"/>
+              <a:t>step in the right direction</a:t>
+            </a:r>
+          </a:p>
+          <a:p>
+            <a:pPr marL="0" indent="0">
+              <a:buNone/>
+            </a:pPr>
+            <a:endParaRPr lang="en-US" dirty="0"/>
+          </a:p>
+          <a:p>
+            <a:endParaRPr lang="en-US" dirty="0"/>
+          </a:p>
         </p:txBody>
       </p:sp>
     </p:spTree>
@@ -6580,12 +6645,59 @@
         </p:blipFill>
         <p:spPr>
           <a:xfrm>
-            <a:off x="6705600" y="2136002"/>
-            <a:ext cx="4648200" cy="1495425"/>
+            <a:off x="5608498" y="2898275"/>
+            <a:ext cx="5745302" cy="1848386"/>
           </a:xfrm>
           <a:prstGeom prst="rect">
             <a:avLst/>
           </a:prstGeom>
+        </p:spPr>
+      </p:pic>
+      <p:pic>
+        <p:nvPicPr>
+          <p:cNvPr id="1026" name="Picture 2" descr="Erlang, logo Icon in Vector Logo">
+            <a:extLst>
+              <a:ext uri="{FF2B5EF4-FFF2-40B4-BE49-F238E27FC236}">
+                <a16:creationId xmlns:a16="http://schemas.microsoft.com/office/drawing/2014/main" id="{571D8DB2-9E97-AEBE-9EFC-6910555212D4}"/>
+              </a:ext>
+            </a:extLst>
+          </p:cNvPr>
+          <p:cNvPicPr>
+            <a:picLocks noChangeAspect="1" noChangeArrowheads="1"/>
+          </p:cNvPicPr>
+          <p:nvPr/>
+        </p:nvPicPr>
+        <p:blipFill>
+          <a:blip r:embed="rId3">
+            <a:extLst>
+              <a:ext uri="{28A0092B-C50C-407E-A947-70E740481C1C}">
+                <a14:useLocalDpi xmlns:a14="http://schemas.microsoft.com/office/drawing/2010/main" val="0"/>
+              </a:ext>
+            </a:extLst>
+          </a:blip>
+          <a:srcRect/>
+          <a:stretch>
+            <a:fillRect/>
+          </a:stretch>
+        </p:blipFill>
+        <p:spPr bwMode="auto">
+          <a:xfrm>
+            <a:off x="9210675" y="591049"/>
+            <a:ext cx="2143125" cy="2143125"/>
+          </a:xfrm>
+          <a:prstGeom prst="rect">
+            <a:avLst/>
+          </a:prstGeom>
+          <a:noFill/>
+          <a:extLst>
+            <a:ext uri="{909E8E84-426E-40DD-AFC4-6F175D3DCCD1}">
+              <a14:hiddenFill xmlns:a14="http://schemas.microsoft.com/office/drawing/2010/main">
+                <a:solidFill>
+                  <a:srgbClr val="FFFFFF"/>
+                </a:solidFill>
+              </a14:hiddenFill>
+            </a:ext>
+          </a:extLst>
         </p:spPr>
       </p:pic>
     </p:spTree>
@@ -8749,15 +8861,6 @@
 </file>
 
 <file path=customXml/item1.xml><?xml version="1.0" encoding="utf-8"?>
-<?mso-contentType ?>
-<FormTemplates xmlns="http://schemas.microsoft.com/sharepoint/v3/contenttype/forms">
-  <Display>DocumentLibraryForm</Display>
-  <Edit>DocumentLibraryForm</Edit>
-  <New>DocumentLibraryForm</New>
-</FormTemplates>
-</file>
-
-<file path=customXml/item2.xml><?xml version="1.0" encoding="utf-8"?>
 <p:properties xmlns:p="http://schemas.microsoft.com/office/2006/metadata/properties" xmlns:xsi="http://www.w3.org/2001/XMLSchema-instance" xmlns:pc="http://schemas.microsoft.com/office/infopath/2007/PartnerControls">
   <documentManagement>
     <_dlc_DocId xmlns="ee5a019c-1afb-4a7f-aa3c-a300d54b8a94">4ZA6FPYH4N22-134279970-49061</_dlc_DocId>
@@ -8773,57 +8876,16 @@
 </p:properties>
 </file>
 
-<file path=customXml/item3.xml><?xml version="1.0" encoding="utf-8"?>
+<file path=customXml/item2.xml><?xml version="1.0" encoding="utf-8"?>
 <?mso-contentType ?>
-<spe:Receivers xmlns:spe="http://schemas.microsoft.com/sharepoint/events">
-  <Receiver>
-    <Name>Document ID Generator</Name>
-    <Synchronization>Synchronous</Synchronization>
-    <Type>10001</Type>
-    <SequenceNumber>1000</SequenceNumber>
-    <Url/>
-    <Assembly>Microsoft.Office.DocumentManagement, Version=16.0.0.0, Culture=neutral, PublicKeyToken=71e9bce111e9429c</Assembly>
-    <Class>Microsoft.Office.DocumentManagement.Internal.DocIdHandler</Class>
-    <Data/>
-    <Filter/>
-  </Receiver>
-  <Receiver>
-    <Name>Document ID Generator</Name>
-    <Synchronization>Synchronous</Synchronization>
-    <Type>10002</Type>
-    <SequenceNumber>1001</SequenceNumber>
-    <Url/>
-    <Assembly>Microsoft.Office.DocumentManagement, Version=16.0.0.0, Culture=neutral, PublicKeyToken=71e9bce111e9429c</Assembly>
-    <Class>Microsoft.Office.DocumentManagement.Internal.DocIdHandler</Class>
-    <Data/>
-    <Filter/>
-  </Receiver>
-  <Receiver>
-    <Name>Document ID Generator</Name>
-    <Synchronization>Synchronous</Synchronization>
-    <Type>10004</Type>
-    <SequenceNumber>1002</SequenceNumber>
-    <Url/>
-    <Assembly>Microsoft.Office.DocumentManagement, Version=16.0.0.0, Culture=neutral, PublicKeyToken=71e9bce111e9429c</Assembly>
-    <Class>Microsoft.Office.DocumentManagement.Internal.DocIdHandler</Class>
-    <Data/>
-    <Filter/>
-  </Receiver>
-  <Receiver>
-    <Name>Document ID Generator</Name>
-    <Synchronization>Synchronous</Synchronization>
-    <Type>10006</Type>
-    <SequenceNumber>1003</SequenceNumber>
-    <Url/>
-    <Assembly>Microsoft.Office.DocumentManagement, Version=16.0.0.0, Culture=neutral, PublicKeyToken=71e9bce111e9429c</Assembly>
-    <Class>Microsoft.Office.DocumentManagement.Internal.DocIdHandler</Class>
-    <Data/>
-    <Filter/>
-  </Receiver>
-</spe:Receivers>
+<FormTemplates xmlns="http://schemas.microsoft.com/sharepoint/v3/contenttype/forms">
+  <Display>DocumentLibraryForm</Display>
+  <Edit>DocumentLibraryForm</Edit>
+  <New>DocumentLibraryForm</New>
+</FormTemplates>
 </file>
 
-<file path=customXml/item4.xml><?xml version="1.0" encoding="utf-8"?>
+<file path=customXml/item3.xml><?xml version="1.0" encoding="utf-8"?>
 <ct:contentTypeSchema xmlns:ct="http://schemas.microsoft.com/office/2006/metadata/contentType" xmlns:ma="http://schemas.microsoft.com/office/2006/metadata/properties/metaAttributes" ct:_="" ma:_="" ma:contentTypeName="Document" ma:contentTypeID="0x0101003F118A156F01C84E8E5E451D60C9243C" ma:contentTypeVersion="18" ma:contentTypeDescription="Create a new document." ma:contentTypeScope="" ma:versionID="81bba4710e6ed34fea4bd7f33693d27f">
   <xsd:schema xmlns:xsd="http://www.w3.org/2001/XMLSchema" xmlns:xs="http://www.w3.org/2001/XMLSchema" xmlns:p="http://schemas.microsoft.com/office/2006/metadata/properties" xmlns:ns2="ee5a019c-1afb-4a7f-aa3c-a300d54b8a94" xmlns:ns3="3d51c85a-c808-4fa3-a7c4-399d30d41b71" xmlns:ns4="cabbaafa-9d61-4c96-bf36-3d40c487f168" targetNamespace="http://schemas.microsoft.com/office/2006/metadata/properties" ma:root="true" ma:fieldsID="ea50bd8bc227bb2cc5fe2d0a23ee5167" ns2:_="" ns3:_="" ns4:_="">
     <xsd:import namespace="ee5a019c-1afb-4a7f-aa3c-a300d54b8a94"/>
@@ -9096,15 +9158,57 @@
 </ct:contentTypeSchema>
 </file>
 
-<file path=customXml/itemProps1.xml><?xml version="1.0" encoding="utf-8"?>
-<ds:datastoreItem xmlns:ds="http://schemas.openxmlformats.org/officeDocument/2006/customXml" ds:itemID="{450D9D61-AB1C-42DB-97B3-F16948BBEDA5}">
-  <ds:schemaRefs>
-    <ds:schemaRef ds:uri="http://schemas.microsoft.com/sharepoint/v3/contenttype/forms"/>
-  </ds:schemaRefs>
-</ds:datastoreItem>
+<file path=customXml/item4.xml><?xml version="1.0" encoding="utf-8"?>
+<?mso-contentType ?>
+<spe:Receivers xmlns:spe="http://schemas.microsoft.com/sharepoint/events">
+  <Receiver>
+    <Name>Document ID Generator</Name>
+    <Synchronization>Synchronous</Synchronization>
+    <Type>10001</Type>
+    <SequenceNumber>1000</SequenceNumber>
+    <Url/>
+    <Assembly>Microsoft.Office.DocumentManagement, Version=16.0.0.0, Culture=neutral, PublicKeyToken=71e9bce111e9429c</Assembly>
+    <Class>Microsoft.Office.DocumentManagement.Internal.DocIdHandler</Class>
+    <Data/>
+    <Filter/>
+  </Receiver>
+  <Receiver>
+    <Name>Document ID Generator</Name>
+    <Synchronization>Synchronous</Synchronization>
+    <Type>10002</Type>
+    <SequenceNumber>1001</SequenceNumber>
+    <Url/>
+    <Assembly>Microsoft.Office.DocumentManagement, Version=16.0.0.0, Culture=neutral, PublicKeyToken=71e9bce111e9429c</Assembly>
+    <Class>Microsoft.Office.DocumentManagement.Internal.DocIdHandler</Class>
+    <Data/>
+    <Filter/>
+  </Receiver>
+  <Receiver>
+    <Name>Document ID Generator</Name>
+    <Synchronization>Synchronous</Synchronization>
+    <Type>10004</Type>
+    <SequenceNumber>1002</SequenceNumber>
+    <Url/>
+    <Assembly>Microsoft.Office.DocumentManagement, Version=16.0.0.0, Culture=neutral, PublicKeyToken=71e9bce111e9429c</Assembly>
+    <Class>Microsoft.Office.DocumentManagement.Internal.DocIdHandler</Class>
+    <Data/>
+    <Filter/>
+  </Receiver>
+  <Receiver>
+    <Name>Document ID Generator</Name>
+    <Synchronization>Synchronous</Synchronization>
+    <Type>10006</Type>
+    <SequenceNumber>1003</SequenceNumber>
+    <Url/>
+    <Assembly>Microsoft.Office.DocumentManagement, Version=16.0.0.0, Culture=neutral, PublicKeyToken=71e9bce111e9429c</Assembly>
+    <Class>Microsoft.Office.DocumentManagement.Internal.DocIdHandler</Class>
+    <Data/>
+    <Filter/>
+  </Receiver>
+</spe:Receivers>
 </file>
 
-<file path=customXml/itemProps2.xml><?xml version="1.0" encoding="utf-8"?>
+<file path=customXml/itemProps1.xml><?xml version="1.0" encoding="utf-8"?>
 <ds:datastoreItem xmlns:ds="http://schemas.openxmlformats.org/officeDocument/2006/customXml" ds:itemID="{28013F97-F744-428B-8504-911AB7D87FBC}">
   <ds:schemaRefs>
     <ds:schemaRef ds:uri="ee5a019c-1afb-4a7f-aa3c-a300d54b8a94"/>
@@ -9115,15 +9219,15 @@
 </ds:datastoreItem>
 </file>
 
-<file path=customXml/itemProps3.xml><?xml version="1.0" encoding="utf-8"?>
-<ds:datastoreItem xmlns:ds="http://schemas.openxmlformats.org/officeDocument/2006/customXml" ds:itemID="{23731FFE-AA89-41C8-A8D1-96335015AC7D}">
+<file path=customXml/itemProps2.xml><?xml version="1.0" encoding="utf-8"?>
+<ds:datastoreItem xmlns:ds="http://schemas.openxmlformats.org/officeDocument/2006/customXml" ds:itemID="{450D9D61-AB1C-42DB-97B3-F16948BBEDA5}">
   <ds:schemaRefs>
-    <ds:schemaRef ds:uri="http://schemas.microsoft.com/sharepoint/events"/>
+    <ds:schemaRef ds:uri="http://schemas.microsoft.com/sharepoint/v3/contenttype/forms"/>
   </ds:schemaRefs>
 </ds:datastoreItem>
 </file>
 
-<file path=customXml/itemProps4.xml><?xml version="1.0" encoding="utf-8"?>
+<file path=customXml/itemProps3.xml><?xml version="1.0" encoding="utf-8"?>
 <ds:datastoreItem xmlns:ds="http://schemas.openxmlformats.org/officeDocument/2006/customXml" ds:itemID="{D75CE82B-2AB8-470D-8DBA-A4AFD7F9BDEE}">
   <ds:schemaRefs>
     <ds:schemaRef ds:uri="http://schemas.microsoft.com/office/2006/metadata/contentType"/>
@@ -9141,4 +9245,12 @@
     <ds:schemaRef ds:uri="http://schemas.microsoft.com/internal/obd"/>
   </ds:schemaRefs>
 </ds:datastoreItem>
+</file>
+
+<file path=customXml/itemProps4.xml><?xml version="1.0" encoding="utf-8"?>
+<ds:datastoreItem xmlns:ds="http://schemas.openxmlformats.org/officeDocument/2006/customXml" ds:itemID="{23731FFE-AA89-41C8-A8D1-96335015AC7D}">
+  <ds:schemaRefs>
+    <ds:schemaRef ds:uri="http://schemas.microsoft.com/sharepoint/events"/>
+  </ds:schemaRefs>
+</ds:datastoreItem>
 </file>
</xml_diff>

<commit_message>
Added a point in BEAM benefits
</commit_message>
<xml_diff>
--- a/Elixir.pptx
+++ b/Elixir.pptx
@@ -954,7 +954,7 @@
           </a:ln>
           <a:extLst>
             <a:ext uri="{C572A759-6A51-4108-AA02-DFA0A04FC94B}">
-              <ma14:wrappingTextBoxFlag xmlns="" xmlns:ma14="http://schemas.microsoft.com/office/mac/drawingml/2011/main" xmlns:a14="http://schemas.microsoft.com/office/drawing/2010/main" xmlns:m="http://schemas.openxmlformats.org/officeDocument/2006/math" val="1"/>
+              <ma14:wrappingTextBoxFlag xmlns:m="http://schemas.openxmlformats.org/officeDocument/2006/math" xmlns:a14="http://schemas.microsoft.com/office/drawing/2010/main" xmlns:ma14="http://schemas.microsoft.com/office/mac/drawingml/2011/main" xmlns="" val="1"/>
             </a:ext>
           </a:extLst>
         </p:spPr>
@@ -1229,7 +1229,7 @@
           </a:ln>
           <a:extLst>
             <a:ext uri="{C572A759-6A51-4108-AA02-DFA0A04FC94B}">
-              <ma14:wrappingTextBoxFlag xmlns="" xmlns:ma14="http://schemas.microsoft.com/office/mac/drawingml/2011/main" xmlns:a14="http://schemas.microsoft.com/office/drawing/2010/main" xmlns:m="http://schemas.openxmlformats.org/officeDocument/2006/math" val="1"/>
+              <ma14:wrappingTextBoxFlag xmlns:m="http://schemas.openxmlformats.org/officeDocument/2006/math" xmlns:a14="http://schemas.microsoft.com/office/drawing/2010/main" xmlns:ma14="http://schemas.microsoft.com/office/mac/drawingml/2011/main" xmlns="" val="1"/>
             </a:ext>
           </a:extLst>
         </p:spPr>
@@ -1668,7 +1668,7 @@
           </a:ln>
           <a:extLst>
             <a:ext uri="{C572A759-6A51-4108-AA02-DFA0A04FC94B}">
-              <ma14:wrappingTextBoxFlag xmlns="" xmlns:ma14="http://schemas.microsoft.com/office/mac/drawingml/2011/main" xmlns:a14="http://schemas.microsoft.com/office/drawing/2010/main" xmlns:m="http://schemas.openxmlformats.org/officeDocument/2006/math" val="1"/>
+              <ma14:wrappingTextBoxFlag xmlns:m="http://schemas.openxmlformats.org/officeDocument/2006/math" xmlns:a14="http://schemas.microsoft.com/office/drawing/2010/main" xmlns:ma14="http://schemas.microsoft.com/office/mac/drawingml/2011/main" xmlns="" val="1"/>
             </a:ext>
           </a:extLst>
         </p:spPr>
@@ -1888,7 +1888,7 @@
           </a:ln>
           <a:extLst>
             <a:ext uri="{C572A759-6A51-4108-AA02-DFA0A04FC94B}">
-              <ma14:wrappingTextBoxFlag xmlns="" xmlns:ma14="http://schemas.microsoft.com/office/mac/drawingml/2011/main" xmlns:a14="http://schemas.microsoft.com/office/drawing/2010/main" xmlns:m="http://schemas.openxmlformats.org/officeDocument/2006/math" val="1"/>
+              <ma14:wrappingTextBoxFlag xmlns:m="http://schemas.openxmlformats.org/officeDocument/2006/math" xmlns:a14="http://schemas.microsoft.com/office/drawing/2010/main" xmlns:ma14="http://schemas.microsoft.com/office/mac/drawingml/2011/main" xmlns="" val="1"/>
             </a:ext>
           </a:extLst>
         </p:spPr>
@@ -2089,7 +2089,7 @@
           </a:ln>
           <a:extLst>
             <a:ext uri="{C572A759-6A51-4108-AA02-DFA0A04FC94B}">
-              <ma14:wrappingTextBoxFlag xmlns="" xmlns:ma14="http://schemas.microsoft.com/office/mac/drawingml/2011/main" xmlns:a14="http://schemas.microsoft.com/office/drawing/2010/main" xmlns:m="http://schemas.openxmlformats.org/officeDocument/2006/math" val="1"/>
+              <ma14:wrappingTextBoxFlag xmlns:m="http://schemas.openxmlformats.org/officeDocument/2006/math" xmlns:a14="http://schemas.microsoft.com/office/drawing/2010/main" xmlns:ma14="http://schemas.microsoft.com/office/mac/drawingml/2011/main" xmlns="" val="1"/>
             </a:ext>
           </a:extLst>
         </p:spPr>
@@ -2188,7 +2188,7 @@
           </a:ln>
           <a:extLst>
             <a:ext uri="{C572A759-6A51-4108-AA02-DFA0A04FC94B}">
-              <ma14:wrappingTextBoxFlag xmlns="" xmlns:ma14="http://schemas.microsoft.com/office/mac/drawingml/2011/main" xmlns:a14="http://schemas.microsoft.com/office/drawing/2010/main" xmlns:m="http://schemas.openxmlformats.org/officeDocument/2006/math" val="1"/>
+              <ma14:wrappingTextBoxFlag xmlns:m="http://schemas.openxmlformats.org/officeDocument/2006/math" xmlns:a14="http://schemas.microsoft.com/office/drawing/2010/main" xmlns:ma14="http://schemas.microsoft.com/office/mac/drawingml/2011/main" xmlns="" val="1"/>
             </a:ext>
           </a:extLst>
         </p:spPr>
@@ -2227,7 +2227,7 @@
           </a:ln>
           <a:extLst>
             <a:ext uri="{C572A759-6A51-4108-AA02-DFA0A04FC94B}">
-              <ma14:wrappingTextBoxFlag xmlns="" xmlns:ma14="http://schemas.microsoft.com/office/mac/drawingml/2011/main" xmlns:a14="http://schemas.microsoft.com/office/drawing/2010/main" xmlns:m="http://schemas.openxmlformats.org/officeDocument/2006/math" val="1"/>
+              <ma14:wrappingTextBoxFlag xmlns:m="http://schemas.openxmlformats.org/officeDocument/2006/math" xmlns:a14="http://schemas.microsoft.com/office/drawing/2010/main" xmlns:ma14="http://schemas.microsoft.com/office/mac/drawingml/2011/main" xmlns="" val="1"/>
             </a:ext>
           </a:extLst>
         </p:spPr>
@@ -2387,7 +2387,7 @@
           </a:ln>
           <a:extLst>
             <a:ext uri="{C572A759-6A51-4108-AA02-DFA0A04FC94B}">
-              <ma14:wrappingTextBoxFlag xmlns="" xmlns:ma14="http://schemas.microsoft.com/office/mac/drawingml/2011/main" xmlns:a14="http://schemas.microsoft.com/office/drawing/2010/main" xmlns:m="http://schemas.openxmlformats.org/officeDocument/2006/math" val="1"/>
+              <ma14:wrappingTextBoxFlag xmlns:m="http://schemas.openxmlformats.org/officeDocument/2006/math" xmlns:a14="http://schemas.microsoft.com/office/drawing/2010/main" xmlns:ma14="http://schemas.microsoft.com/office/mac/drawingml/2011/main" xmlns="" val="1"/>
             </a:ext>
           </a:extLst>
         </p:spPr>
@@ -4701,7 +4701,7 @@
         <p:spPr/>
         <p:txBody>
           <a:bodyPr>
-            <a:normAutofit lnSpcReduction="10000"/>
+            <a:normAutofit fontScale="92500" lnSpcReduction="10000"/>
           </a:bodyPr>
           <a:lstStyle/>
           <a:p>
@@ -4733,6 +4733,13 @@
             <a:r>
               <a:rPr lang="en-US" dirty="0"/>
               <a:t>Built-in load balancing</a:t>
+            </a:r>
+          </a:p>
+          <a:p>
+            <a:pPr lvl="1"/>
+            <a:r>
+              <a:rPr lang="en-US" dirty="0"/>
+              <a:t>Hot deployment</a:t>
             </a:r>
           </a:p>
           <a:p>
@@ -8861,6 +8868,15 @@
 </file>
 
 <file path=customXml/item1.xml><?xml version="1.0" encoding="utf-8"?>
+<?mso-contentType ?>
+<FormTemplates xmlns="http://schemas.microsoft.com/sharepoint/v3/contenttype/forms">
+  <Display>DocumentLibraryForm</Display>
+  <Edit>DocumentLibraryForm</Edit>
+  <New>DocumentLibraryForm</New>
+</FormTemplates>
+</file>
+
+<file path=customXml/item2.xml><?xml version="1.0" encoding="utf-8"?>
 <p:properties xmlns:p="http://schemas.microsoft.com/office/2006/metadata/properties" xmlns:xsi="http://www.w3.org/2001/XMLSchema-instance" xmlns:pc="http://schemas.microsoft.com/office/infopath/2007/PartnerControls">
   <documentManagement>
     <_dlc_DocId xmlns="ee5a019c-1afb-4a7f-aa3c-a300d54b8a94">4ZA6FPYH4N22-134279970-49061</_dlc_DocId>
@@ -8876,16 +8892,57 @@
 </p:properties>
 </file>
 
-<file path=customXml/item2.xml><?xml version="1.0" encoding="utf-8"?>
+<file path=customXml/item3.xml><?xml version="1.0" encoding="utf-8"?>
 <?mso-contentType ?>
-<FormTemplates xmlns="http://schemas.microsoft.com/sharepoint/v3/contenttype/forms">
-  <Display>DocumentLibraryForm</Display>
-  <Edit>DocumentLibraryForm</Edit>
-  <New>DocumentLibraryForm</New>
-</FormTemplates>
+<spe:Receivers xmlns:spe="http://schemas.microsoft.com/sharepoint/events">
+  <Receiver>
+    <Name>Document ID Generator</Name>
+    <Synchronization>Synchronous</Synchronization>
+    <Type>10001</Type>
+    <SequenceNumber>1000</SequenceNumber>
+    <Url/>
+    <Assembly>Microsoft.Office.DocumentManagement, Version=16.0.0.0, Culture=neutral, PublicKeyToken=71e9bce111e9429c</Assembly>
+    <Class>Microsoft.Office.DocumentManagement.Internal.DocIdHandler</Class>
+    <Data/>
+    <Filter/>
+  </Receiver>
+  <Receiver>
+    <Name>Document ID Generator</Name>
+    <Synchronization>Synchronous</Synchronization>
+    <Type>10002</Type>
+    <SequenceNumber>1001</SequenceNumber>
+    <Url/>
+    <Assembly>Microsoft.Office.DocumentManagement, Version=16.0.0.0, Culture=neutral, PublicKeyToken=71e9bce111e9429c</Assembly>
+    <Class>Microsoft.Office.DocumentManagement.Internal.DocIdHandler</Class>
+    <Data/>
+    <Filter/>
+  </Receiver>
+  <Receiver>
+    <Name>Document ID Generator</Name>
+    <Synchronization>Synchronous</Synchronization>
+    <Type>10004</Type>
+    <SequenceNumber>1002</SequenceNumber>
+    <Url/>
+    <Assembly>Microsoft.Office.DocumentManagement, Version=16.0.0.0, Culture=neutral, PublicKeyToken=71e9bce111e9429c</Assembly>
+    <Class>Microsoft.Office.DocumentManagement.Internal.DocIdHandler</Class>
+    <Data/>
+    <Filter/>
+  </Receiver>
+  <Receiver>
+    <Name>Document ID Generator</Name>
+    <Synchronization>Synchronous</Synchronization>
+    <Type>10006</Type>
+    <SequenceNumber>1003</SequenceNumber>
+    <Url/>
+    <Assembly>Microsoft.Office.DocumentManagement, Version=16.0.0.0, Culture=neutral, PublicKeyToken=71e9bce111e9429c</Assembly>
+    <Class>Microsoft.Office.DocumentManagement.Internal.DocIdHandler</Class>
+    <Data/>
+    <Filter/>
+  </Receiver>
+</spe:Receivers>
 </file>
 
-<file path=customXml/item3.xml><?xml version="1.0" encoding="utf-8"?>
+<file path=customXml/item4.xml><?xml version="1.0" encoding="utf-8"?>
 <ct:contentTypeSchema xmlns:ct="http://schemas.microsoft.com/office/2006/metadata/contentType" xmlns:ma="http://schemas.microsoft.com/office/2006/metadata/properties/metaAttributes" ct:_="" ma:_="" ma:contentTypeName="Document" ma:contentTypeID="0x0101003F118A156F01C84E8E5E451D60C9243C" ma:contentTypeVersion="18" ma:contentTypeDescription="Create a new document." ma:contentTypeScope="" ma:versionID="81bba4710e6ed34fea4bd7f33693d27f">
   <xsd:schema xmlns:xsd="http://www.w3.org/2001/XMLSchema" xmlns:xs="http://www.w3.org/2001/XMLSchema" xmlns:p="http://schemas.microsoft.com/office/2006/metadata/properties" xmlns:ns2="ee5a019c-1afb-4a7f-aa3c-a300d54b8a94" xmlns:ns3="3d51c85a-c808-4fa3-a7c4-399d30d41b71" xmlns:ns4="cabbaafa-9d61-4c96-bf36-3d40c487f168" targetNamespace="http://schemas.microsoft.com/office/2006/metadata/properties" ma:root="true" ma:fieldsID="ea50bd8bc227bb2cc5fe2d0a23ee5167" ns2:_="" ns3:_="" ns4:_="">
     <xsd:import namespace="ee5a019c-1afb-4a7f-aa3c-a300d54b8a94"/>
@@ -9158,57 +9215,15 @@
 </ct:contentTypeSchema>
 </file>
 
-<file path=customXml/item4.xml><?xml version="1.0" encoding="utf-8"?>
-<?mso-contentType ?>
-<spe:Receivers xmlns:spe="http://schemas.microsoft.com/sharepoint/events">
-  <Receiver>
-    <Name>Document ID Generator</Name>
-    <Synchronization>Synchronous</Synchronization>
-    <Type>10001</Type>
-    <SequenceNumber>1000</SequenceNumber>
-    <Url/>
-    <Assembly>Microsoft.Office.DocumentManagement, Version=16.0.0.0, Culture=neutral, PublicKeyToken=71e9bce111e9429c</Assembly>
-    <Class>Microsoft.Office.DocumentManagement.Internal.DocIdHandler</Class>
-    <Data/>
-    <Filter/>
-  </Receiver>
-  <Receiver>
-    <Name>Document ID Generator</Name>
-    <Synchronization>Synchronous</Synchronization>
-    <Type>10002</Type>
-    <SequenceNumber>1001</SequenceNumber>
-    <Url/>
-    <Assembly>Microsoft.Office.DocumentManagement, Version=16.0.0.0, Culture=neutral, PublicKeyToken=71e9bce111e9429c</Assembly>
-    <Class>Microsoft.Office.DocumentManagement.Internal.DocIdHandler</Class>
-    <Data/>
-    <Filter/>
-  </Receiver>
-  <Receiver>
-    <Name>Document ID Generator</Name>
-    <Synchronization>Synchronous</Synchronization>
-    <Type>10004</Type>
-    <SequenceNumber>1002</SequenceNumber>
-    <Url/>
-    <Assembly>Microsoft.Office.DocumentManagement, Version=16.0.0.0, Culture=neutral, PublicKeyToken=71e9bce111e9429c</Assembly>
-    <Class>Microsoft.Office.DocumentManagement.Internal.DocIdHandler</Class>
-    <Data/>
-    <Filter/>
-  </Receiver>
-  <Receiver>
-    <Name>Document ID Generator</Name>
-    <Synchronization>Synchronous</Synchronization>
-    <Type>10006</Type>
-    <SequenceNumber>1003</SequenceNumber>
-    <Url/>
-    <Assembly>Microsoft.Office.DocumentManagement, Version=16.0.0.0, Culture=neutral, PublicKeyToken=71e9bce111e9429c</Assembly>
-    <Class>Microsoft.Office.DocumentManagement.Internal.DocIdHandler</Class>
-    <Data/>
-    <Filter/>
-  </Receiver>
-</spe:Receivers>
+<file path=customXml/itemProps1.xml><?xml version="1.0" encoding="utf-8"?>
+<ds:datastoreItem xmlns:ds="http://schemas.openxmlformats.org/officeDocument/2006/customXml" ds:itemID="{450D9D61-AB1C-42DB-97B3-F16948BBEDA5}">
+  <ds:schemaRefs>
+    <ds:schemaRef ds:uri="http://schemas.microsoft.com/sharepoint/v3/contenttype/forms"/>
+  </ds:schemaRefs>
+</ds:datastoreItem>
 </file>
 
-<file path=customXml/itemProps1.xml><?xml version="1.0" encoding="utf-8"?>
+<file path=customXml/itemProps2.xml><?xml version="1.0" encoding="utf-8"?>
 <ds:datastoreItem xmlns:ds="http://schemas.openxmlformats.org/officeDocument/2006/customXml" ds:itemID="{28013F97-F744-428B-8504-911AB7D87FBC}">
   <ds:schemaRefs>
     <ds:schemaRef ds:uri="ee5a019c-1afb-4a7f-aa3c-a300d54b8a94"/>
@@ -9219,15 +9234,15 @@
 </ds:datastoreItem>
 </file>
 
-<file path=customXml/itemProps2.xml><?xml version="1.0" encoding="utf-8"?>
-<ds:datastoreItem xmlns:ds="http://schemas.openxmlformats.org/officeDocument/2006/customXml" ds:itemID="{450D9D61-AB1C-42DB-97B3-F16948BBEDA5}">
+<file path=customXml/itemProps3.xml><?xml version="1.0" encoding="utf-8"?>
+<ds:datastoreItem xmlns:ds="http://schemas.openxmlformats.org/officeDocument/2006/customXml" ds:itemID="{23731FFE-AA89-41C8-A8D1-96335015AC7D}">
   <ds:schemaRefs>
-    <ds:schemaRef ds:uri="http://schemas.microsoft.com/sharepoint/v3/contenttype/forms"/>
+    <ds:schemaRef ds:uri="http://schemas.microsoft.com/sharepoint/events"/>
   </ds:schemaRefs>
 </ds:datastoreItem>
 </file>
 
-<file path=customXml/itemProps3.xml><?xml version="1.0" encoding="utf-8"?>
+<file path=customXml/itemProps4.xml><?xml version="1.0" encoding="utf-8"?>
 <ds:datastoreItem xmlns:ds="http://schemas.openxmlformats.org/officeDocument/2006/customXml" ds:itemID="{D75CE82B-2AB8-470D-8DBA-A4AFD7F9BDEE}">
   <ds:schemaRefs>
     <ds:schemaRef ds:uri="http://schemas.microsoft.com/office/2006/metadata/contentType"/>
@@ -9245,12 +9260,4 @@
     <ds:schemaRef ds:uri="http://schemas.microsoft.com/internal/obd"/>
   </ds:schemaRefs>
 </ds:datastoreItem>
-</file>
-
-<file path=customXml/itemProps4.xml><?xml version="1.0" encoding="utf-8"?>
-<ds:datastoreItem xmlns:ds="http://schemas.openxmlformats.org/officeDocument/2006/customXml" ds:itemID="{23731FFE-AA89-41C8-A8D1-96335015AC7D}">
-  <ds:schemaRefs>
-    <ds:schemaRef ds:uri="http://schemas.microsoft.com/sharepoint/events"/>
-  </ds:schemaRefs>
-</ds:datastoreItem>
 </file>
</xml_diff>